<commit_message>
fixed 2 missing references
</commit_message>
<xml_diff>
--- a/presentation_slides/PresentationSlides.pptx
+++ b/presentation_slides/PresentationSlides.pptx
@@ -12678,16 +12678,13 @@
             <a:pPr lvl="1"/>
             <a:r>
               <a:rPr lang="en-US" dirty="0" smtClean="0"/>
-              <a:t>“Recent large outages at Amazon and Google have shown that even the largest cloud vendors can still have glitches that take considerable time to repair. ” (</a:t>
-            </a:r>
-            <a:r>
-              <a:rPr lang="en-US" dirty="0" err="1" smtClean="0"/>
-              <a:t>Enki</a:t>
+              <a:t>“Recent large outages at Amazon and Google have shown that even the largest cloud vendors can still have glitches that take considerable time to repair. ” </a:t>
             </a:r>
             <a:r>
               <a:rPr lang="en-US" dirty="0" smtClean="0"/>
-              <a:t>, 2010)</a:t>
-            </a:r>
+              <a:t>[18]</a:t>
+            </a:r>
+            <a:endParaRPr lang="en-US" dirty="0" smtClean="0"/>
           </a:p>
           <a:p>
             <a:pPr lvl="1"/>
@@ -12697,16 +12694,13 @@
             <a:pPr lvl="1"/>
             <a:r>
               <a:rPr lang="en-US" dirty="0" smtClean="0"/>
-              <a:t>“Despite claims of reliability, few cloud vendors have tight service level agreements that promise controlled downtime or offer rebates for excess downtime. ” (</a:t>
-            </a:r>
-            <a:r>
-              <a:rPr lang="en-US" dirty="0" err="1" smtClean="0"/>
-              <a:t>Enki</a:t>
+              <a:t>“Despite claims of reliability, few cloud vendors have tight service level agreements that promise controlled downtime or offer rebates for excess downtime. ” </a:t>
             </a:r>
             <a:r>
               <a:rPr lang="en-US" dirty="0" smtClean="0"/>
-              <a:t>, 2010)</a:t>
-            </a:r>
+              <a:t>[18]</a:t>
+            </a:r>
+            <a:endParaRPr lang="en-US" dirty="0" smtClean="0"/>
           </a:p>
           <a:p>
             <a:pPr lvl="1"/>
@@ -12852,8 +12846,13 @@
             <a:pPr lvl="0"/>
             <a:r>
               <a:rPr lang="en-US" dirty="0" smtClean="0"/>
-              <a:t>Although Reliability in cloud computing is a major concern, it is a strong selling point. [18]</a:t>
-            </a:r>
+              <a:t>Although Reliability in cloud computing is a major concern, it is a strong selling point. [</a:t>
+            </a:r>
+            <a:r>
+              <a:rPr lang="en-US" dirty="0" smtClean="0"/>
+              <a:t>19]</a:t>
+            </a:r>
+            <a:endParaRPr lang="en-US" dirty="0" smtClean="0"/>
           </a:p>
         </p:txBody>
       </p:sp>
@@ -13045,8 +13044,13 @@
           <a:p>
             <a:r>
               <a:rPr lang="en-US" dirty="0" smtClean="0"/>
-              <a:t>There is no standard for cloud computing metrics. [19]</a:t>
-            </a:r>
+              <a:t>There is no standard for cloud computing metrics. </a:t>
+            </a:r>
+            <a:r>
+              <a:rPr lang="en-US" dirty="0" smtClean="0"/>
+              <a:t>[20]</a:t>
+            </a:r>
+            <a:endParaRPr lang="en-US" dirty="0" smtClean="0"/>
           </a:p>
           <a:p>
             <a:pPr lvl="1"/>
@@ -13745,8 +13749,13 @@
           <a:p>
             <a:r>
               <a:rPr lang="en-US" dirty="0" smtClean="0"/>
-              <a:t>"There are different clouds from companies such as Microsoft, Amazon, … and Google, but a lack of interoperability between them.“ (Cerf, 2010)</a:t>
-            </a:r>
+              <a:t>"There are different clouds from companies such as Microsoft, Amazon, … and Google, but a lack of interoperability between them.“ </a:t>
+            </a:r>
+            <a:r>
+              <a:rPr lang="en-US" dirty="0" smtClean="0"/>
+              <a:t>[21]</a:t>
+            </a:r>
+            <a:endParaRPr lang="en-US" dirty="0" smtClean="0"/>
           </a:p>
           <a:p>
             <a:r>
@@ -13945,7 +13954,7 @@
           <a:p>
             <a:r>
               <a:rPr lang="en-CA" dirty="0" smtClean="0"/>
-              <a:t>References</a:t>
+              <a:t>References:</a:t>
             </a:r>
             <a:endParaRPr lang="en-CA" dirty="0"/>
           </a:p>
@@ -13968,77 +13977,39 @@
           <a:p>
             <a:r>
               <a:rPr lang="en-CA" sz="1200" dirty="0" smtClean="0"/>
-              <a:t>[1</a:t>
-            </a:r>
-            <a:r>
-              <a:rPr lang="en-CA" sz="1200" dirty="0" smtClean="0"/>
-              <a:t>] I, Foster. (2002)“What is The Grid? A Three Point Checklist”, Available: </a:t>
+              <a:t>[1] I, Foster. (2002)“What is The Grid? A Three Point Checklist”, Available: </a:t>
             </a:r>
             <a:r>
               <a:rPr lang="en-CA" sz="1200" dirty="0" smtClean="0">
                 <a:hlinkClick r:id="rId3"/>
               </a:rPr>
-              <a:t>http</a:t>
-            </a:r>
-            <a:r>
-              <a:rPr lang="en-CA" sz="1200" dirty="0" smtClean="0">
-                <a:hlinkClick r:id="rId3"/>
-              </a:rPr>
-              <a:t>://</a:t>
-            </a:r>
-            <a:r>
-              <a:rPr lang="en-CA" sz="1200" dirty="0" smtClean="0">
-                <a:hlinkClick r:id="rId3"/>
-              </a:rPr>
-              <a:t>dlib.cs.odu.edu/WhatIsTheGrid.pdf</a:t>
+              <a:t>http://dlib.cs.odu.edu/WhatIsTheGrid.pdf</a:t>
             </a:r>
             <a:r>
               <a:rPr lang="en-CA" sz="1200" dirty="0" smtClean="0"/>
               <a:t>, Accessed March 17, 2011</a:t>
             </a:r>
-            <a:endParaRPr lang="en-CA" sz="1200" dirty="0" smtClean="0"/>
           </a:p>
           <a:p>
             <a:r>
               <a:rPr lang="en-CA" sz="1200" dirty="0" smtClean="0"/>
-              <a:t>[2</a:t>
-            </a:r>
-            <a:r>
-              <a:rPr lang="en-CA" sz="1200" dirty="0" smtClean="0"/>
-              <a:t>]”OGF Standards”, Available: </a:t>
+              <a:t>[2]”OGF Standards”, Available: </a:t>
             </a:r>
             <a:r>
               <a:rPr lang="en-CA" sz="1200" dirty="0" smtClean="0">
                 <a:hlinkClick r:id="rId4"/>
               </a:rPr>
-              <a:t>http</a:t>
-            </a:r>
-            <a:r>
-              <a:rPr lang="en-CA" sz="1200" dirty="0" smtClean="0">
-                <a:hlinkClick r:id="rId4"/>
-              </a:rPr>
-              <a:t>://www.gridforum.org/standards</a:t>
-            </a:r>
-            <a:r>
-              <a:rPr lang="en-CA" sz="1200" dirty="0" smtClean="0">
-                <a:hlinkClick r:id="rId4"/>
-              </a:rPr>
-              <a:t>/</a:t>
+              <a:t>http://www.gridforum.org/standards/</a:t>
             </a:r>
             <a:r>
               <a:rPr lang="en-CA" sz="1200" dirty="0" smtClean="0"/>
               <a:t>, Accessed March 17,2011</a:t>
             </a:r>
-            <a:endParaRPr lang="en-CA" sz="1200" dirty="0" smtClean="0"/>
           </a:p>
           <a:p>
             <a:r>
               <a:rPr lang="en-CA" sz="1200" dirty="0" smtClean="0"/>
-              <a:t>[</a:t>
-            </a:r>
-            <a:r>
-              <a:rPr lang="en-CA" sz="1200" dirty="0" smtClean="0"/>
-              <a:t>3] (1969), “UCLA Set To Be First Station In Nationwide Network” Available: </a:t>
+              <a:t>[3] (1969), “UCLA Set To Be First Station In Nationwide Network” Available: </a:t>
             </a:r>
             <a:r>
               <a:rPr lang="en-CA" sz="1200" dirty="0" smtClean="0">
@@ -14050,16 +14021,11 @@
               <a:rPr lang="en-CA" sz="1200" dirty="0" smtClean="0"/>
               <a:t>, 2011</a:t>
             </a:r>
-            <a:endParaRPr lang="en-CA" sz="1200" dirty="0" smtClean="0"/>
           </a:p>
           <a:p>
             <a:r>
               <a:rPr lang="en-CA" sz="1200" dirty="0" smtClean="0"/>
-              <a:t>[</a:t>
-            </a:r>
-            <a:r>
-              <a:rPr lang="en-CA" sz="1200" dirty="0" smtClean="0"/>
-              <a:t>4]F, </a:t>
+              <a:t>[4]F, </a:t>
             </a:r>
             <a:r>
               <a:rPr lang="en-CA" sz="1200" dirty="0" err="1" smtClean="0"/>
@@ -14071,11 +14037,7 @@
             </a:r>
             <a:r>
               <a:rPr lang="en-US" sz="1200" dirty="0" smtClean="0"/>
-              <a:t>Grid computing: making the global infrastructure a </a:t>
-            </a:r>
-            <a:r>
-              <a:rPr lang="en-US" sz="1200" dirty="0" smtClean="0"/>
-              <a:t>reality“. Available: </a:t>
+              <a:t>Grid computing: making the global infrastructure a reality“. Available: </a:t>
             </a:r>
             <a:r>
               <a:rPr lang="en-CA" sz="1200" dirty="0" smtClean="0">
@@ -14087,20 +14049,11 @@
               <a:rPr lang="en-CA" sz="1200" dirty="0" smtClean="0"/>
               <a:t> Accessed: March 19, 2011.</a:t>
             </a:r>
-            <a:endParaRPr lang="en-CA" sz="1200" dirty="0" smtClean="0"/>
           </a:p>
           <a:p>
             <a:r>
               <a:rPr lang="en-CA" sz="1200" dirty="0" smtClean="0"/>
-              <a:t>[</a:t>
-            </a:r>
-            <a:r>
-              <a:rPr lang="en-CA" sz="1200" dirty="0" smtClean="0"/>
-              <a:t>5</a:t>
-            </a:r>
-            <a:r>
-              <a:rPr lang="en-CA" sz="1200" dirty="0" smtClean="0"/>
-              <a:t>]A. </a:t>
+              <a:t>[5]A. </a:t>
             </a:r>
             <a:r>
               <a:rPr lang="en-CA" sz="1200" dirty="0" err="1" smtClean="0"/>
@@ -14120,20 +14073,11 @@
               <a:rPr lang="en-CA" sz="1200" dirty="0" smtClean="0"/>
               <a:t>, Accessed March 20, 2011.</a:t>
             </a:r>
-            <a:endParaRPr lang="en-CA" sz="1200" dirty="0" smtClean="0"/>
           </a:p>
           <a:p>
             <a:r>
               <a:rPr lang="en-CA" sz="1200" dirty="0" smtClean="0"/>
-              <a:t>[6</a:t>
-            </a:r>
-            <a:r>
-              <a:rPr lang="en-CA" sz="1200" dirty="0" smtClean="0"/>
-              <a:t>] </a:t>
-            </a:r>
-            <a:r>
-              <a:rPr lang="en-CA" sz="1200" dirty="0" smtClean="0"/>
-              <a:t>“</a:t>
+              <a:t>[6] “</a:t>
             </a:r>
             <a:r>
               <a:rPr lang="en-CA" sz="1200" dirty="0" err="1" smtClean="0"/>
@@ -14147,34 +14091,17 @@
               <a:rPr lang="en-CA" sz="1200" dirty="0" smtClean="0">
                 <a:hlinkClick r:id="rId8"/>
               </a:rPr>
-              <a:t>http</a:t>
-            </a:r>
-            <a:r>
-              <a:rPr lang="en-CA" sz="1200" dirty="0" smtClean="0">
-                <a:hlinkClick r:id="rId8"/>
-              </a:rPr>
-              <a:t>://</a:t>
-            </a:r>
-            <a:r>
-              <a:rPr lang="en-CA" sz="1200" dirty="0" smtClean="0">
-                <a:hlinkClick r:id="rId8"/>
-              </a:rPr>
-              <a:t>boincstats.com/stats/project_graph.php?pr=sah</a:t>
+              <a:t>http://boincstats.com/stats/project_graph.php?pr=sah</a:t>
             </a:r>
             <a:r>
               <a:rPr lang="en-CA" sz="1200" dirty="0" smtClean="0"/>
               <a:t>, Accessed: March 2011</a:t>
             </a:r>
-            <a:endParaRPr lang="en-CA" sz="1200" dirty="0" smtClean="0"/>
           </a:p>
           <a:p>
             <a:r>
               <a:rPr lang="en-CA" sz="1200" dirty="0" smtClean="0"/>
-              <a:t>[7] </a:t>
-            </a:r>
-            <a:r>
-              <a:rPr lang="en-CA" sz="1200" dirty="0" smtClean="0"/>
-              <a:t>“</a:t>
+              <a:t>[7] “</a:t>
             </a:r>
             <a:r>
               <a:rPr lang="en-CA" sz="1200" dirty="0" err="1" smtClean="0"/>
@@ -14188,34 +14115,17 @@
               <a:rPr lang="en-CA" sz="1200" dirty="0" smtClean="0">
                 <a:hlinkClick r:id="rId9"/>
               </a:rPr>
-              <a:t>http</a:t>
-            </a:r>
-            <a:r>
-              <a:rPr lang="en-CA" sz="1200" dirty="0" smtClean="0">
-                <a:hlinkClick r:id="rId9"/>
-              </a:rPr>
-              <a:t>://folding.stanford.edu</a:t>
-            </a:r>
-            <a:r>
-              <a:rPr lang="en-CA" sz="1200" dirty="0" smtClean="0">
-                <a:hlinkClick r:id="rId9"/>
-              </a:rPr>
-              <a:t>/</a:t>
+              <a:t>http://folding.stanford.edu/</a:t>
             </a:r>
             <a:r>
               <a:rPr lang="en-CA" sz="1200" dirty="0" smtClean="0"/>
               <a:t>, Accessed: March 20, 2011</a:t>
             </a:r>
-            <a:endParaRPr lang="en-CA" sz="1200" dirty="0" smtClean="0"/>
           </a:p>
           <a:p>
             <a:r>
               <a:rPr lang="en-CA" sz="1200" dirty="0" smtClean="0"/>
-              <a:t>[8</a:t>
-            </a:r>
-            <a:r>
-              <a:rPr lang="en-CA" sz="1200" dirty="0" smtClean="0"/>
-              <a:t>] “</a:t>
+              <a:t>[8] “</a:t>
             </a:r>
             <a:r>
               <a:rPr lang="en-CA" sz="1200" dirty="0" err="1" smtClean="0"/>
@@ -14229,19 +14139,12 @@
               <a:rPr lang="en-CA" sz="1200" dirty="0" smtClean="0">
                 <a:hlinkClick r:id="rId10"/>
               </a:rPr>
-              <a:t>https://www.teragrid.org</a:t>
-            </a:r>
-            <a:r>
-              <a:rPr lang="en-CA" sz="1200" smtClean="0">
-                <a:hlinkClick r:id="rId10"/>
-              </a:rPr>
-              <a:t>/</a:t>
-            </a:r>
-            <a:r>
-              <a:rPr lang="en-CA" sz="1200" smtClean="0"/>
+              <a:t>https://www.teragrid.org/</a:t>
+            </a:r>
+            <a:r>
+              <a:rPr lang="en-CA" sz="1200" dirty="0" smtClean="0"/>
               <a:t>, Accessed: March 20,2011</a:t>
             </a:r>
-            <a:endParaRPr lang="en-CA" sz="1200" dirty="0" smtClean="0"/>
           </a:p>
           <a:p>
             <a:endParaRPr lang="en-CA" sz="1200" dirty="0" smtClean="0"/>
@@ -14719,93 +14622,127 @@
           <a:lstStyle/>
           <a:p>
             <a:r>
-              <a:rPr lang="en-CA" sz="1400" dirty="0" smtClean="0"/>
-              <a:t>[16] Foley, John (2009a). “How government’s driving cloud computing ahead.” InformationWeek, July 4, 2009. retrieved July 14, 2009, from </a:t>
-            </a:r>
-            <a:r>
-              <a:rPr lang="en-CA" sz="1100" dirty="0" smtClean="0"/>
-              <a:t>informationweek.com/news/government/technology/</a:t>
-            </a:r>
-            <a:r>
-              <a:rPr lang="en-CA" sz="1100" dirty="0" err="1" smtClean="0"/>
+              <a:rPr lang="en-CA" sz="1200" dirty="0" smtClean="0"/>
+              <a:t>[16] Foley, John (2009a). “How government’s driving cloud computing ahead.” InformationWeek, July 4, 2009. retrieved July 14, 2009, from informationweek.com/news/government/technology/</a:t>
+            </a:r>
+            <a:r>
+              <a:rPr lang="en-CA" sz="1200" dirty="0" err="1" smtClean="0"/>
               <a:t>showArticle.jhtml?articleiD</a:t>
             </a:r>
             <a:r>
-              <a:rPr lang="en-CA" sz="1100" dirty="0" smtClean="0"/>
+              <a:rPr lang="en-CA" sz="1200" dirty="0" smtClean="0"/>
               <a:t>=218400025.</a:t>
             </a:r>
-            <a:endParaRPr lang="en-US" sz="1400" dirty="0" smtClean="0"/>
-          </a:p>
-          <a:p>
-            <a:r>
-              <a:rPr lang="en-US" sz="1400" dirty="0" smtClean="0"/>
+            <a:endParaRPr lang="en-US" sz="1200" dirty="0" smtClean="0"/>
+          </a:p>
+          <a:p>
+            <a:r>
+              <a:rPr lang="en-US" sz="1200" dirty="0" smtClean="0"/>
               <a:t>[17] Mackey, Dick (2010). </a:t>
             </a:r>
             <a:r>
-              <a:rPr lang="en-CA" sz="1400" dirty="0" smtClean="0"/>
+              <a:rPr lang="en-CA" sz="1200" dirty="0" smtClean="0"/>
               <a:t>“</a:t>
             </a:r>
             <a:r>
-              <a:rPr lang="en-US" sz="1400" dirty="0" smtClean="0"/>
+              <a:rPr lang="en-US" sz="1200" dirty="0" smtClean="0"/>
               <a:t>Moving to the Cloud: An Introduction to Cloud Computing in Government</a:t>
             </a:r>
             <a:r>
-              <a:rPr lang="en-CA" sz="1400" dirty="0" smtClean="0"/>
-              <a:t>” Retrieved Mar. 15, 2011 from </a:t>
-            </a:r>
-            <a:r>
-              <a:rPr lang="en-CA" sz="1100" dirty="0" smtClean="0"/>
-              <a:t>http://www.etransform.org/gti/sites/etransform.org/files/Documents/2010-07%20IBM%20Business%20of%20Gov%20-%20Cloud%20Computing%20in%20Government.pdf </a:t>
-            </a:r>
-          </a:p>
-          <a:p>
-            <a:r>
-              <a:rPr lang="en-CA" sz="1400" dirty="0" smtClean="0"/>
-              <a:t>[18] Sun, Raymond J (2010). “</a:t>
-            </a:r>
-            <a:r>
-              <a:rPr lang="en-US" sz="1400" dirty="0" smtClean="0"/>
+              <a:rPr lang="en-CA" sz="1200" dirty="0" smtClean="0"/>
+              <a:t>” Retrieved Mar. 15, 2011 from http://www.etransform.org/gti/sites/etransform.org/files/Documents/2010-07%20IBM%20Business%20of%20Gov%20-%20Cloud%20Computing%20in%20Government.pdf </a:t>
+            </a:r>
+          </a:p>
+          <a:p>
+            <a:r>
+              <a:rPr lang="en-CA" sz="1200" dirty="0" smtClean="0"/>
+              <a:t>[</a:t>
+            </a:r>
+            <a:r>
+              <a:rPr lang="en-CA" sz="1200" dirty="0" smtClean="0"/>
+              <a:t>19] </a:t>
+            </a:r>
+            <a:r>
+              <a:rPr lang="en-CA" sz="1200" dirty="0" smtClean="0"/>
+              <a:t>Sun, Raymond J (2010). “</a:t>
+            </a:r>
+            <a:r>
+              <a:rPr lang="en-US" sz="1200" dirty="0" smtClean="0"/>
               <a:t>Cloud Computing: Looking for Security, Reliability and Resiliency</a:t>
             </a:r>
             <a:r>
-              <a:rPr lang="en-CA" sz="1400" dirty="0" smtClean="0"/>
-              <a:t>” Retrieved March 21, 2011, from </a:t>
-            </a:r>
-            <a:r>
-              <a:rPr lang="en-CA" sz="1100" dirty="0" smtClean="0"/>
-              <a:t>http://www.baselinemag.com/c/a/Utility-Computing/Cloud-Computing-Looking-for-Security-Reliability-Resiliency-466013/</a:t>
-            </a:r>
-            <a:endParaRPr lang="en-CA" sz="1400" dirty="0" smtClean="0"/>
-          </a:p>
-          <a:p>
-            <a:r>
-              <a:rPr lang="en-CA" sz="1400" dirty="0" smtClean="0"/>
-              <a:t>[19] Fogarty, Kevin (2010). “</a:t>
-            </a:r>
-            <a:r>
-              <a:rPr lang="en-US" sz="1400" dirty="0" smtClean="0"/>
+              <a:rPr lang="en-CA" sz="1200" dirty="0" smtClean="0"/>
+              <a:t>” Retrieved March 21, 2011, from http://www.baselinemag.com/c/a/Utility-Computing/Cloud-Computing-Looking-for-Security-Reliability-Resiliency-466013</a:t>
+            </a:r>
+            <a:r>
+              <a:rPr lang="en-CA" sz="1200" dirty="0" smtClean="0"/>
+              <a:t>/</a:t>
+            </a:r>
+          </a:p>
+          <a:p>
+            <a:r>
+              <a:rPr lang="en-CA" sz="1200" dirty="0" smtClean="0"/>
+              <a:t>[18]</a:t>
+            </a:r>
+            <a:r>
+              <a:rPr lang="en-CA" sz="1200" dirty="0" smtClean="0"/>
+              <a:t> </a:t>
+            </a:r>
+            <a:r>
+              <a:rPr lang="en-CA" sz="1200" dirty="0" err="1" smtClean="0"/>
+              <a:t>Enki</a:t>
+            </a:r>
+            <a:r>
+              <a:rPr lang="en-CA" sz="1200" dirty="0" smtClean="0"/>
+              <a:t>(2010</a:t>
+            </a:r>
+            <a:r>
+              <a:rPr lang="en-CA" sz="1200" dirty="0" smtClean="0"/>
+              <a:t>). </a:t>
+            </a:r>
+            <a:r>
+              <a:rPr lang="en-CA" sz="1200" dirty="0" smtClean="0"/>
+              <a:t>“RELIABILITY AND CLOUD COMPUTING” </a:t>
+            </a:r>
+            <a:r>
+              <a:rPr lang="en-CA" sz="1200" dirty="0" smtClean="0"/>
+              <a:t>Retrieved March 21, 2011, from http://www.enki.co/blog/reliability-and-cloud-computing.html</a:t>
+            </a:r>
+            <a:endParaRPr lang="en-CA" sz="1200" dirty="0" smtClean="0"/>
+          </a:p>
+          <a:p>
+            <a:r>
+              <a:rPr lang="en-CA" sz="1200" dirty="0" smtClean="0"/>
+              <a:t>[20] </a:t>
+            </a:r>
+            <a:r>
+              <a:rPr lang="en-CA" sz="1200" dirty="0" smtClean="0"/>
+              <a:t>Fogarty, Kevin (2010). “</a:t>
+            </a:r>
+            <a:r>
+              <a:rPr lang="en-US" sz="1200" dirty="0" smtClean="0"/>
               <a:t>Cloud performance metrics: No standards, so mileage varies</a:t>
             </a:r>
             <a:r>
-              <a:rPr lang="en-CA" sz="1400" dirty="0" smtClean="0"/>
-              <a:t>.” Retrieved March 21, 2011, from </a:t>
-            </a:r>
-            <a:r>
-              <a:rPr lang="en-CA" sz="1100" dirty="0" smtClean="0"/>
-              <a:t>http://www.networksasia.net/content/cloud-performance-metrics-no-standards-so-mileage-varies</a:t>
-            </a:r>
-          </a:p>
-          <a:p>
-            <a:r>
-              <a:rPr lang="en-CA" sz="1400" dirty="0" smtClean="0"/>
-              <a:t>IDC “</a:t>
-            </a:r>
-            <a:r>
-              <a:rPr lang="en-US" sz="1400" dirty="0" smtClean="0"/>
+              <a:rPr lang="en-CA" sz="1200" dirty="0" smtClean="0"/>
+              <a:t>.” Retrieved March 21, 2011, from http://www.networksasia.net/content/cloud-performance-metrics-no-standards-so-mileage-varies</a:t>
+            </a:r>
+          </a:p>
+          <a:p>
+            <a:r>
+              <a:rPr lang="en-CA" sz="1200" dirty="0" smtClean="0"/>
+              <a:t>[21] IDC </a:t>
+            </a:r>
+            <a:r>
+              <a:rPr lang="en-CA" sz="1200" dirty="0" smtClean="0"/>
+              <a:t>“</a:t>
+            </a:r>
+            <a:r>
+              <a:rPr lang="en-US" sz="1200" dirty="0" smtClean="0"/>
               <a:t>Cloud Computing 2010. An IDC Update</a:t>
             </a:r>
             <a:r>
-              <a:rPr lang="en-CA" sz="1400" dirty="0" smtClean="0"/>
+              <a:rPr lang="en-CA" sz="1200" dirty="0" smtClean="0"/>
               <a:t>” Retrieved Mar. 16, 2011 from http://www.slideshare.net/JorFigOr/cloud-computing-2010-an-idc-update</a:t>
             </a:r>
           </a:p>

</xml_diff>